<commit_message>
Update instructions with treasure hunt (#24)
</commit_message>
<xml_diff>
--- a/instructions/GNSS positioning algo - answers.pptx
+++ b/instructions/GNSS positioning algo - answers.pptx
@@ -5,7 +5,7 @@
     <p:sldMasterId id="2147483813" r:id="rId4"/>
   </p:sldMasterIdLst>
   <p:notesMasterIdLst>
-    <p:notesMasterId r:id="rId26"/>
+    <p:notesMasterId r:id="rId31"/>
   </p:notesMasterIdLst>
   <p:sldIdLst>
     <p:sldId id="494" r:id="rId5"/>
@@ -16,19 +16,24 @@
     <p:sldId id="502" r:id="rId10"/>
     <p:sldId id="503" r:id="rId11"/>
     <p:sldId id="504" r:id="rId12"/>
-    <p:sldId id="256" r:id="rId13"/>
-    <p:sldId id="264" r:id="rId14"/>
-    <p:sldId id="509" r:id="rId15"/>
-    <p:sldId id="510" r:id="rId16"/>
-    <p:sldId id="261" r:id="rId17"/>
-    <p:sldId id="505" r:id="rId18"/>
-    <p:sldId id="265" r:id="rId19"/>
-    <p:sldId id="273" r:id="rId20"/>
-    <p:sldId id="506" r:id="rId21"/>
-    <p:sldId id="274" r:id="rId22"/>
-    <p:sldId id="282" r:id="rId23"/>
-    <p:sldId id="508" r:id="rId24"/>
-    <p:sldId id="507" r:id="rId25"/>
+    <p:sldId id="515" r:id="rId13"/>
+    <p:sldId id="256" r:id="rId14"/>
+    <p:sldId id="264" r:id="rId15"/>
+    <p:sldId id="509" r:id="rId16"/>
+    <p:sldId id="510" r:id="rId17"/>
+    <p:sldId id="261" r:id="rId18"/>
+    <p:sldId id="505" r:id="rId19"/>
+    <p:sldId id="511" r:id="rId20"/>
+    <p:sldId id="265" r:id="rId21"/>
+    <p:sldId id="273" r:id="rId22"/>
+    <p:sldId id="506" r:id="rId23"/>
+    <p:sldId id="512" r:id="rId24"/>
+    <p:sldId id="274" r:id="rId25"/>
+    <p:sldId id="282" r:id="rId26"/>
+    <p:sldId id="508" r:id="rId27"/>
+    <p:sldId id="507" r:id="rId28"/>
+    <p:sldId id="513" r:id="rId29"/>
+    <p:sldId id="514" r:id="rId30"/>
   </p:sldIdLst>
   <p:sldSz cx="9144000" cy="5143500" type="screen16x9"/>
   <p:notesSz cx="6858000" cy="9144000"/>
@@ -140,6 +145,7 @@
             <p14:sldId id="502"/>
             <p14:sldId id="503"/>
             <p14:sldId id="504"/>
+            <p14:sldId id="515"/>
           </p14:sldIdLst>
         </p14:section>
         <p14:section name="Answers" id="{33746D98-59B1-4E66-A86F-A3B02C5E3C8D}">
@@ -150,13 +156,17 @@
             <p14:sldId id="510"/>
             <p14:sldId id="261"/>
             <p14:sldId id="505"/>
+            <p14:sldId id="511"/>
             <p14:sldId id="265"/>
             <p14:sldId id="273"/>
             <p14:sldId id="506"/>
+            <p14:sldId id="512"/>
             <p14:sldId id="274"/>
             <p14:sldId id="282"/>
             <p14:sldId id="508"/>
             <p14:sldId id="507"/>
+            <p14:sldId id="513"/>
+            <p14:sldId id="514"/>
           </p14:sldIdLst>
         </p14:section>
       </p14:sectionLst>
@@ -315,7 +325,7 @@
             <a:fld id="{D680E798-53FF-4C51-A981-953463752515}" type="datetimeFigureOut">
               <a:rPr lang="fr-FR" smtClean="0"/>
               <a:pPr/>
-              <a:t>30/10/2025</a:t>
+              <a:t>20/11/2025</a:t>
             </a:fld>
             <a:endParaRPr lang="fr-FR" dirty="0"/>
           </a:p>
@@ -1843,7 +1853,7 @@
           <a:p>
             <a:fld id="{5BCAD085-E8A6-8845-BD4E-CB4CCA059FC4}" type="datetimeFigureOut">
               <a:rPr lang="en-US" smtClean="0"/>
-              <a:t>30-Oct-25</a:t>
+              <a:t>20-Nov-25</a:t>
             </a:fld>
             <a:endParaRPr lang="en-US"/>
           </a:p>
@@ -2011,7 +2021,7 @@
           <a:p>
             <a:fld id="{5BCAD085-E8A6-8845-BD4E-CB4CCA059FC4}" type="datetimeFigureOut">
               <a:rPr lang="en-US" smtClean="0"/>
-              <a:t>30-Oct-25</a:t>
+              <a:t>20-Nov-25</a:t>
             </a:fld>
             <a:endParaRPr lang="en-US"/>
           </a:p>
@@ -2827,7 +2837,7 @@
             <a:spLocks noGrp="1"/>
           </p:cNvSpPr>
           <p:nvPr>
-            <p:ph type="title"/>
+            <p:ph type="ctrTitle"/>
           </p:nvPr>
         </p:nvSpPr>
         <p:spPr/>
@@ -2835,22 +2845,45 @@
           <a:bodyPr/>
           <a:lstStyle/>
           <a:p>
+            <a:pPr algn="ctr"/>
+            <a:r>
+              <a:rPr dirty="0"/>
+              <a:t>Chapter </a:t>
+            </a:r>
             <a:r>
               <a:rPr lang="en-US" dirty="0"/>
-              <a:t>Misc questions</a:t>
-            </a:r>
-            <a:endParaRPr dirty="0"/>
-          </a:p>
-        </p:txBody>
-      </p:sp>
-      <p:sp>
-        <p:nvSpPr>
-          <p:cNvPr id="3" name="Content Placeholder 2"/>
+              <a:t>0</a:t>
+            </a:r>
+            <a:r>
+              <a:rPr dirty="0"/>
+              <a:t>: </a:t>
+            </a:r>
+            <a:r>
+              <a:rPr lang="en-US" dirty="0">
+                <a:latin typeface="Consolas" panose="020B0609020204030204" pitchFamily="49" charset="0"/>
+              </a:rPr>
+              <a:t>pandas</a:t>
+            </a:r>
+            <a:endParaRPr dirty="0">
+              <a:latin typeface="Consolas" panose="020B0609020204030204" pitchFamily="49" charset="0"/>
+            </a:endParaRPr>
+          </a:p>
+        </p:txBody>
+      </p:sp>
+      <p:sp>
+        <p:nvSpPr>
+          <p:cNvPr id="5" name="Subtitle 4">
+            <a:extLst>
+              <a:ext uri="{FF2B5EF4-FFF2-40B4-BE49-F238E27FC236}">
+                <a16:creationId xmlns:a16="http://schemas.microsoft.com/office/drawing/2014/main" id="{81014CAC-BFF3-451A-AF06-77505E4206E4}"/>
+              </a:ext>
+            </a:extLst>
+          </p:cNvPr>
           <p:cNvSpPr>
             <a:spLocks noGrp="1"/>
           </p:cNvSpPr>
           <p:nvPr>
-            <p:ph idx="1"/>
+            <p:ph type="subTitle" idx="1"/>
           </p:nvPr>
         </p:nvSpPr>
         <p:spPr/>
@@ -2858,51 +2891,7 @@
           <a:bodyPr/>
           <a:lstStyle/>
           <a:p>
-            <a:pPr marL="434975" indent="-342900">
-              <a:buFont typeface="Arial" panose="020B0604020202020204" pitchFamily="34" charset="0"/>
-              <a:buChar char="•"/>
-            </a:pPr>
-            <a:r>
-              <a:rPr lang="en-US" dirty="0"/>
-              <a:t>How many observations are there for GPS L1C signals from healthy satellites over 24 hours?</a:t>
-            </a:r>
-          </a:p>
-          <a:p>
-            <a:pPr marL="434975" indent="-342900">
-              <a:buFont typeface="Arial" panose="020B0604020202020204" pitchFamily="34" charset="0"/>
-              <a:buChar char="•"/>
-            </a:pPr>
-            <a:r>
-              <a:rPr lang="en-US" dirty="0"/>
-              <a:t>What is the min/max value of the </a:t>
-            </a:r>
-            <a:r>
-              <a:rPr lang="en-US" dirty="0" err="1"/>
-              <a:t>iono</a:t>
-            </a:r>
-            <a:r>
-              <a:rPr lang="en-US" dirty="0"/>
-              <a:t> delay?</a:t>
-            </a:r>
-          </a:p>
-          <a:p>
-            <a:pPr marL="434975" indent="-342900">
-              <a:buFont typeface="Arial" panose="020B0604020202020204" pitchFamily="34" charset="0"/>
-              <a:buChar char="•"/>
-            </a:pPr>
-            <a:r>
-              <a:rPr lang="en-US" dirty="0"/>
-              <a:t>Paste your figure generated by </a:t>
-            </a:r>
-            <a:r>
-              <a:rPr lang="en-US" sz="1600" dirty="0" err="1">
-                <a:latin typeface="Consolas" panose="020B0609020204030204" pitchFamily="49" charset="0"/>
-              </a:rPr>
-              <a:t>plot_nsat_vs_elevation_mask</a:t>
-            </a:r>
-            <a:endParaRPr dirty="0">
-              <a:latin typeface="Consolas" panose="020B0609020204030204" pitchFamily="49" charset="0"/>
-            </a:endParaRPr>
+            <a:endParaRPr lang="en-US"/>
           </a:p>
         </p:txBody>
       </p:sp>
@@ -2915,6 +2904,117 @@
 </file>
 
 <file path=ppt/slides/slide11.xml><?xml version="1.0" encoding="utf-8"?>
+<p:sld xmlns:a="http://schemas.openxmlformats.org/drawingml/2006/main" xmlns:r="http://schemas.openxmlformats.org/officeDocument/2006/relationships" xmlns:p="http://schemas.openxmlformats.org/presentationml/2006/main">
+  <p:cSld>
+    <p:spTree>
+      <p:nvGrpSpPr>
+        <p:cNvPr id="1" name=""/>
+        <p:cNvGrpSpPr/>
+        <p:nvPr/>
+      </p:nvGrpSpPr>
+      <p:grpSpPr>
+        <a:xfrm>
+          <a:off x="0" y="0"/>
+          <a:ext cx="0" cy="0"/>
+          <a:chOff x="0" y="0"/>
+          <a:chExt cx="0" cy="0"/>
+        </a:xfrm>
+      </p:grpSpPr>
+      <p:sp>
+        <p:nvSpPr>
+          <p:cNvPr id="2" name="Title 1"/>
+          <p:cNvSpPr>
+            <a:spLocks noGrp="1"/>
+          </p:cNvSpPr>
+          <p:nvPr>
+            <p:ph type="title"/>
+          </p:nvPr>
+        </p:nvSpPr>
+        <p:spPr/>
+        <p:txBody>
+          <a:bodyPr/>
+          <a:lstStyle/>
+          <a:p>
+            <a:r>
+              <a:rPr lang="en-US" dirty="0"/>
+              <a:t>Misc questions</a:t>
+            </a:r>
+            <a:endParaRPr dirty="0"/>
+          </a:p>
+        </p:txBody>
+      </p:sp>
+      <p:sp>
+        <p:nvSpPr>
+          <p:cNvPr id="3" name="Content Placeholder 2"/>
+          <p:cNvSpPr>
+            <a:spLocks noGrp="1"/>
+          </p:cNvSpPr>
+          <p:nvPr>
+            <p:ph idx="1"/>
+          </p:nvPr>
+        </p:nvSpPr>
+        <p:spPr/>
+        <p:txBody>
+          <a:bodyPr/>
+          <a:lstStyle/>
+          <a:p>
+            <a:pPr marL="434975" indent="-342900">
+              <a:buFont typeface="Arial" panose="020B0604020202020204" pitchFamily="34" charset="0"/>
+              <a:buChar char="•"/>
+            </a:pPr>
+            <a:r>
+              <a:rPr lang="en-US" dirty="0"/>
+              <a:t>How many observations are there for GPS L1C signals from healthy satellites over 24 hours?</a:t>
+            </a:r>
+          </a:p>
+          <a:p>
+            <a:pPr marL="434975" indent="-342900">
+              <a:buFont typeface="Arial" panose="020B0604020202020204" pitchFamily="34" charset="0"/>
+              <a:buChar char="•"/>
+            </a:pPr>
+            <a:r>
+              <a:rPr lang="en-US" dirty="0"/>
+              <a:t>What is the min/max value of the </a:t>
+            </a:r>
+            <a:r>
+              <a:rPr lang="en-US" dirty="0" err="1"/>
+              <a:t>iono</a:t>
+            </a:r>
+            <a:r>
+              <a:rPr lang="en-US" dirty="0"/>
+              <a:t> delay?</a:t>
+            </a:r>
+          </a:p>
+          <a:p>
+            <a:pPr marL="434975" indent="-342900">
+              <a:buFont typeface="Arial" panose="020B0604020202020204" pitchFamily="34" charset="0"/>
+              <a:buChar char="•"/>
+            </a:pPr>
+            <a:r>
+              <a:rPr lang="en-US" dirty="0"/>
+              <a:t>Paste your figure generated by </a:t>
+            </a:r>
+            <a:r>
+              <a:rPr lang="en-US" sz="1600" dirty="0" err="1">
+                <a:latin typeface="Consolas" panose="020B0609020204030204" pitchFamily="49" charset="0"/>
+              </a:rPr>
+              <a:t>plot_nsat_vs_elevation_mask</a:t>
+            </a:r>
+            <a:endParaRPr dirty="0">
+              <a:latin typeface="Consolas" panose="020B0609020204030204" pitchFamily="49" charset="0"/>
+            </a:endParaRPr>
+          </a:p>
+        </p:txBody>
+      </p:sp>
+    </p:spTree>
+  </p:cSld>
+  <p:clrMapOvr>
+    <a:masterClrMapping/>
+  </p:clrMapOvr>
+</p:sld>
+</file>
+
+<file path=ppt/slides/slide12.xml><?xml version="1.0" encoding="utf-8"?>
 <p:sld xmlns:a="http://schemas.openxmlformats.org/drawingml/2006/main" xmlns:r="http://schemas.openxmlformats.org/officeDocument/2006/relationships" xmlns:p="http://schemas.openxmlformats.org/presentationml/2006/main">
   <p:cSld>
     <p:spTree>
@@ -3004,7 +3104,7 @@
 </p:sld>
 </file>
 
-<file path=ppt/slides/slide12.xml><?xml version="1.0" encoding="utf-8"?>
+<file path=ppt/slides/slide13.xml><?xml version="1.0" encoding="utf-8"?>
 <p:sld xmlns:a="http://schemas.openxmlformats.org/drawingml/2006/main" xmlns:r="http://schemas.openxmlformats.org/officeDocument/2006/relationships" xmlns:p="http://schemas.openxmlformats.org/presentationml/2006/main">
   <p:cSld>
     <p:spTree>
@@ -3123,7 +3223,7 @@
 </p:sld>
 </file>
 
-<file path=ppt/slides/slide13.xml><?xml version="1.0" encoding="utf-8"?>
+<file path=ppt/slides/slide14.xml><?xml version="1.0" encoding="utf-8"?>
 <p:sld xmlns:a="http://schemas.openxmlformats.org/drawingml/2006/main" xmlns:r="http://schemas.openxmlformats.org/officeDocument/2006/relationships" xmlns:p="http://schemas.openxmlformats.org/presentationml/2006/main">
   <p:cSld>
     <p:spTree>
@@ -3217,7 +3317,7 @@
 </p:sld>
 </file>
 
-<file path=ppt/slides/slide14.xml><?xml version="1.0" encoding="utf-8"?>
+<file path=ppt/slides/slide15.xml><?xml version="1.0" encoding="utf-8"?>
 <p:sld xmlns:a="http://schemas.openxmlformats.org/drawingml/2006/main" xmlns:r="http://schemas.openxmlformats.org/officeDocument/2006/relationships" xmlns:p="http://schemas.openxmlformats.org/presentationml/2006/main">
   <p:cSld>
     <p:spTree>
@@ -3354,7 +3454,108 @@
 </p:sld>
 </file>
 
-<file path=ppt/slides/slide15.xml><?xml version="1.0" encoding="utf-8"?>
+<file path=ppt/slides/slide16.xml><?xml version="1.0" encoding="utf-8"?>
+<p:sld xmlns:a="http://schemas.openxmlformats.org/drawingml/2006/main" xmlns:r="http://schemas.openxmlformats.org/officeDocument/2006/relationships" xmlns:p="http://schemas.openxmlformats.org/presentationml/2006/main">
+  <p:cSld>
+    <p:spTree>
+      <p:nvGrpSpPr>
+        <p:cNvPr id="1" name="">
+          <a:extLst>
+            <a:ext uri="{FF2B5EF4-FFF2-40B4-BE49-F238E27FC236}">
+              <a16:creationId xmlns:a16="http://schemas.microsoft.com/office/drawing/2014/main" id="{0732E68C-590F-E4A7-CCF9-AC42690C726F}"/>
+            </a:ext>
+          </a:extLst>
+        </p:cNvPr>
+        <p:cNvGrpSpPr/>
+        <p:nvPr/>
+      </p:nvGrpSpPr>
+      <p:grpSpPr>
+        <a:xfrm>
+          <a:off x="0" y="0"/>
+          <a:ext cx="0" cy="0"/>
+          <a:chOff x="0" y="0"/>
+          <a:chExt cx="0" cy="0"/>
+        </a:xfrm>
+      </p:grpSpPr>
+      <p:sp>
+        <p:nvSpPr>
+          <p:cNvPr id="2" name="Title 1">
+            <a:extLst>
+              <a:ext uri="{FF2B5EF4-FFF2-40B4-BE49-F238E27FC236}">
+                <a16:creationId xmlns:a16="http://schemas.microsoft.com/office/drawing/2014/main" id="{57737364-3B22-8AAA-4369-C6D57A1BFAC2}"/>
+              </a:ext>
+            </a:extLst>
+          </p:cNvPr>
+          <p:cNvSpPr>
+            <a:spLocks noGrp="1"/>
+          </p:cNvSpPr>
+          <p:nvPr>
+            <p:ph type="title"/>
+          </p:nvPr>
+        </p:nvSpPr>
+        <p:spPr/>
+        <p:txBody>
+          <a:bodyPr/>
+          <a:lstStyle/>
+          <a:p>
+            <a:r>
+              <a:rPr lang="en-US" dirty="0"/>
+              <a:t>SPP - Treasure hunt</a:t>
+            </a:r>
+            <a:endParaRPr dirty="0"/>
+          </a:p>
+        </p:txBody>
+      </p:sp>
+      <p:sp>
+        <p:nvSpPr>
+          <p:cNvPr id="3" name="Content Placeholder 2">
+            <a:extLst>
+              <a:ext uri="{FF2B5EF4-FFF2-40B4-BE49-F238E27FC236}">
+                <a16:creationId xmlns:a16="http://schemas.microsoft.com/office/drawing/2014/main" id="{DC4BF4FD-49E4-A6DD-7741-40C062FA4F19}"/>
+              </a:ext>
+            </a:extLst>
+          </p:cNvPr>
+          <p:cNvSpPr>
+            <a:spLocks noGrp="1"/>
+          </p:cNvSpPr>
+          <p:nvPr>
+            <p:ph idx="1"/>
+          </p:nvPr>
+        </p:nvSpPr>
+        <p:spPr/>
+        <p:txBody>
+          <a:bodyPr/>
+          <a:lstStyle/>
+          <a:p>
+            <a:pPr marL="434975" indent="-342900">
+              <a:buFont typeface="Arial" panose="020B0604020202020204" pitchFamily="34" charset="0"/>
+              <a:buChar char="•"/>
+            </a:pPr>
+            <a:r>
+              <a:rPr dirty="0"/>
+              <a:t>Paste your ENU error figure</a:t>
+            </a:r>
+            <a:r>
+              <a:rPr lang="en-US" dirty="0"/>
+              <a:t> for SPP solution on the longitude file of the treasure hunt</a:t>
+            </a:r>
+          </a:p>
+        </p:txBody>
+      </p:sp>
+    </p:spTree>
+    <p:extLst>
+      <p:ext uri="{BB962C8B-B14F-4D97-AF65-F5344CB8AC3E}">
+        <p14:creationId xmlns:p14="http://schemas.microsoft.com/office/powerpoint/2010/main" val="3465947433"/>
+      </p:ext>
+    </p:extLst>
+  </p:cSld>
+  <p:clrMapOvr>
+    <a:masterClrMapping/>
+  </p:clrMapOvr>
+</p:sld>
+</file>
+
+<file path=ppt/slides/slide17.xml><?xml version="1.0" encoding="utf-8"?>
 <p:sld xmlns:a="http://schemas.openxmlformats.org/drawingml/2006/main" xmlns:r="http://schemas.openxmlformats.org/officeDocument/2006/relationships" xmlns:p="http://schemas.openxmlformats.org/presentationml/2006/main">
   <p:cSld>
     <p:spTree>
@@ -3414,227 +3615,6 @@
         </p:txBody>
       </p:sp>
     </p:spTree>
-  </p:cSld>
-  <p:clrMapOvr>
-    <a:masterClrMapping/>
-  </p:clrMapOvr>
-</p:sld>
-</file>
-
-<file path=ppt/slides/slide16.xml><?xml version="1.0" encoding="utf-8"?>
-<p:sld xmlns:a="http://schemas.openxmlformats.org/drawingml/2006/main" xmlns:r="http://schemas.openxmlformats.org/officeDocument/2006/relationships" xmlns:p="http://schemas.openxmlformats.org/presentationml/2006/main">
-  <p:cSld>
-    <p:spTree>
-      <p:nvGrpSpPr>
-        <p:cNvPr id="1" name=""/>
-        <p:cNvGrpSpPr/>
-        <p:nvPr/>
-      </p:nvGrpSpPr>
-      <p:grpSpPr>
-        <a:xfrm>
-          <a:off x="0" y="0"/>
-          <a:ext cx="0" cy="0"/>
-          <a:chOff x="0" y="0"/>
-          <a:chExt cx="0" cy="0"/>
-        </a:xfrm>
-      </p:grpSpPr>
-      <p:sp>
-        <p:nvSpPr>
-          <p:cNvPr id="2" name="Title 1"/>
-          <p:cNvSpPr>
-            <a:spLocks noGrp="1"/>
-          </p:cNvSpPr>
-          <p:nvPr>
-            <p:ph type="title"/>
-          </p:nvPr>
-        </p:nvSpPr>
-        <p:spPr/>
-        <p:txBody>
-          <a:bodyPr/>
-          <a:lstStyle/>
-          <a:p>
-            <a:r>
-              <a:rPr lang="en-US" dirty="0"/>
-              <a:t>DGNSS solution</a:t>
-            </a:r>
-            <a:endParaRPr dirty="0"/>
-          </a:p>
-        </p:txBody>
-      </p:sp>
-      <p:sp>
-        <p:nvSpPr>
-          <p:cNvPr id="3" name="Content Placeholder 2"/>
-          <p:cNvSpPr>
-            <a:spLocks noGrp="1"/>
-          </p:cNvSpPr>
-          <p:nvPr>
-            <p:ph idx="1"/>
-          </p:nvPr>
-        </p:nvSpPr>
-        <p:spPr/>
-        <p:txBody>
-          <a:bodyPr/>
-          <a:lstStyle/>
-          <a:p>
-            <a:pPr marL="434975" indent="-342900">
-              <a:buFont typeface="Arial" panose="020B0604020202020204" pitchFamily="34" charset="0"/>
-              <a:buChar char="•"/>
-            </a:pPr>
-            <a:r>
-              <a:rPr lang="en-US" dirty="0"/>
-              <a:t>Paste your ENU error figure.</a:t>
-            </a:r>
-          </a:p>
-          <a:p>
-            <a:pPr marL="434975" indent="-342900">
-              <a:buFont typeface="Arial" panose="020B0604020202020204" pitchFamily="34" charset="0"/>
-              <a:buChar char="•"/>
-            </a:pPr>
-            <a:r>
-              <a:rPr lang="en-US" dirty="0"/>
-              <a:t>Include your score.</a:t>
-            </a:r>
-          </a:p>
-          <a:p>
-            <a:pPr marL="434975" indent="-342900">
-              <a:buFont typeface="Arial" panose="020B0604020202020204" pitchFamily="34" charset="0"/>
-              <a:buChar char="•"/>
-            </a:pPr>
-            <a:r>
-              <a:rPr lang="en-US" dirty="0"/>
-              <a:t>Comment the statistical description of the positioning error.</a:t>
-            </a:r>
-          </a:p>
-          <a:p>
-            <a:pPr marL="434975" indent="-342900">
-              <a:buFont typeface="Arial" panose="020B0604020202020204" pitchFamily="34" charset="0"/>
-              <a:buChar char="•"/>
-            </a:pPr>
-            <a:r>
-              <a:rPr lang="en-US" dirty="0"/>
-              <a:t>Which errors were reduced by differential corrections?</a:t>
-            </a:r>
-          </a:p>
-        </p:txBody>
-      </p:sp>
-    </p:spTree>
-  </p:cSld>
-  <p:clrMapOvr>
-    <a:masterClrMapping/>
-  </p:clrMapOvr>
-</p:sld>
-</file>
-
-<file path=ppt/slides/slide17.xml><?xml version="1.0" encoding="utf-8"?>
-<p:sld xmlns:a="http://schemas.openxmlformats.org/drawingml/2006/main" xmlns:r="http://schemas.openxmlformats.org/officeDocument/2006/relationships" xmlns:p="http://schemas.openxmlformats.org/presentationml/2006/main">
-  <p:cSld>
-    <p:spTree>
-      <p:nvGrpSpPr>
-        <p:cNvPr id="1" name="">
-          <a:extLst>
-            <a:ext uri="{FF2B5EF4-FFF2-40B4-BE49-F238E27FC236}">
-              <a16:creationId xmlns:a16="http://schemas.microsoft.com/office/drawing/2014/main" id="{F7C1D8DC-4B55-716A-FAF6-A74DD003E2BA}"/>
-            </a:ext>
-          </a:extLst>
-        </p:cNvPr>
-        <p:cNvGrpSpPr/>
-        <p:nvPr/>
-      </p:nvGrpSpPr>
-      <p:grpSpPr>
-        <a:xfrm>
-          <a:off x="0" y="0"/>
-          <a:ext cx="0" cy="0"/>
-          <a:chOff x="0" y="0"/>
-          <a:chExt cx="0" cy="0"/>
-        </a:xfrm>
-      </p:grpSpPr>
-      <p:sp>
-        <p:nvSpPr>
-          <p:cNvPr id="2" name="Title 1">
-            <a:extLst>
-              <a:ext uri="{FF2B5EF4-FFF2-40B4-BE49-F238E27FC236}">
-                <a16:creationId xmlns:a16="http://schemas.microsoft.com/office/drawing/2014/main" id="{8365E787-5CF4-A89D-2A20-A1B3FC59B8CE}"/>
-              </a:ext>
-            </a:extLst>
-          </p:cNvPr>
-          <p:cNvSpPr>
-            <a:spLocks noGrp="1"/>
-          </p:cNvSpPr>
-          <p:nvPr>
-            <p:ph type="title"/>
-          </p:nvPr>
-        </p:nvSpPr>
-        <p:spPr/>
-        <p:txBody>
-          <a:bodyPr/>
-          <a:lstStyle/>
-          <a:p>
-            <a:r>
-              <a:rPr lang="en-US" dirty="0"/>
-              <a:t>DGNSS residuals (optional)</a:t>
-            </a:r>
-            <a:endParaRPr dirty="0"/>
-          </a:p>
-        </p:txBody>
-      </p:sp>
-      <p:sp>
-        <p:nvSpPr>
-          <p:cNvPr id="3" name="Content Placeholder 2">
-            <a:extLst>
-              <a:ext uri="{FF2B5EF4-FFF2-40B4-BE49-F238E27FC236}">
-                <a16:creationId xmlns:a16="http://schemas.microsoft.com/office/drawing/2014/main" id="{F7B8CCB6-7967-C324-52F1-7DE93CD603E8}"/>
-              </a:ext>
-            </a:extLst>
-          </p:cNvPr>
-          <p:cNvSpPr>
-            <a:spLocks noGrp="1"/>
-          </p:cNvSpPr>
-          <p:nvPr>
-            <p:ph idx="1"/>
-          </p:nvPr>
-        </p:nvSpPr>
-        <p:spPr/>
-        <p:txBody>
-          <a:bodyPr/>
-          <a:lstStyle/>
-          <a:p>
-            <a:pPr marL="434975" indent="-342900">
-              <a:buFont typeface="Arial" panose="020B0604020202020204" pitchFamily="34" charset="0"/>
-              <a:buChar char="•"/>
-            </a:pPr>
-            <a:r>
-              <a:rPr lang="en-US" dirty="0"/>
-              <a:t>Paste your estimation residual figure.</a:t>
-            </a:r>
-          </a:p>
-          <a:p>
-            <a:pPr marL="434975" indent="-342900">
-              <a:buFont typeface="Arial" panose="020B0604020202020204" pitchFamily="34" charset="0"/>
-              <a:buChar char="•"/>
-            </a:pPr>
-            <a:r>
-              <a:rPr lang="en-US" dirty="0"/>
-              <a:t>Compared to SPP, which errors were reduced by differential corrections?</a:t>
-            </a:r>
-          </a:p>
-          <a:p>
-            <a:pPr marL="434975" indent="-342900">
-              <a:buFont typeface="Arial" panose="020B0604020202020204" pitchFamily="34" charset="0"/>
-              <a:buChar char="•"/>
-            </a:pPr>
-            <a:r>
-              <a:rPr lang="en-US" dirty="0"/>
-              <a:t>Did any error sources increase? </a:t>
-            </a:r>
-          </a:p>
-        </p:txBody>
-      </p:sp>
-    </p:spTree>
-    <p:extLst>
-      <p:ext uri="{BB962C8B-B14F-4D97-AF65-F5344CB8AC3E}">
-        <p14:creationId xmlns:p14="http://schemas.microsoft.com/office/powerpoint/2010/main" val="1896970406"/>
-      </p:ext>
-    </p:extLst>
   </p:cSld>
   <p:clrMapOvr>
     <a:masterClrMapping/>
@@ -3666,7 +3646,7 @@
             <a:spLocks noGrp="1"/>
           </p:cNvSpPr>
           <p:nvPr>
-            <p:ph type="ctrTitle"/>
+            <p:ph type="title"/>
           </p:nvPr>
         </p:nvSpPr>
         <p:spPr/>
@@ -3674,22 +3654,22 @@
           <a:bodyPr/>
           <a:lstStyle/>
           <a:p>
-            <a:pPr algn="ctr"/>
-            <a:r>
-              <a:rPr dirty="0"/>
-              <a:t>Chapter 3: RTK</a:t>
-            </a:r>
-          </a:p>
-        </p:txBody>
-      </p:sp>
-      <p:sp>
-        <p:nvSpPr>
-          <p:cNvPr id="3" name="Subtitle 2"/>
+            <a:r>
+              <a:rPr lang="en-US" dirty="0"/>
+              <a:t>DGNSS solution</a:t>
+            </a:r>
+            <a:endParaRPr dirty="0"/>
+          </a:p>
+        </p:txBody>
+      </p:sp>
+      <p:sp>
+        <p:nvSpPr>
+          <p:cNvPr id="3" name="Content Placeholder 2"/>
           <p:cNvSpPr>
             <a:spLocks noGrp="1"/>
           </p:cNvSpPr>
           <p:nvPr>
-            <p:ph type="subTitle" idx="1"/>
+            <p:ph idx="1"/>
           </p:nvPr>
         </p:nvSpPr>
         <p:spPr/>
@@ -3697,7 +3677,44 @@
           <a:bodyPr/>
           <a:lstStyle/>
           <a:p>
-            <a:endParaRPr dirty="0"/>
+            <a:pPr marL="434975" indent="-342900">
+              <a:buFont typeface="Arial" panose="020B0604020202020204" pitchFamily="34" charset="0"/>
+              <a:buChar char="•"/>
+            </a:pPr>
+            <a:r>
+              <a:rPr lang="en-US" dirty="0"/>
+              <a:t>Paste your ENU error figure.</a:t>
+            </a:r>
+          </a:p>
+          <a:p>
+            <a:pPr marL="434975" indent="-342900">
+              <a:buFont typeface="Arial" panose="020B0604020202020204" pitchFamily="34" charset="0"/>
+              <a:buChar char="•"/>
+            </a:pPr>
+            <a:r>
+              <a:rPr lang="en-US" dirty="0"/>
+              <a:t>Include your score.</a:t>
+            </a:r>
+          </a:p>
+          <a:p>
+            <a:pPr marL="434975" indent="-342900">
+              <a:buFont typeface="Arial" panose="020B0604020202020204" pitchFamily="34" charset="0"/>
+              <a:buChar char="•"/>
+            </a:pPr>
+            <a:r>
+              <a:rPr lang="en-US" dirty="0"/>
+              <a:t>Comment the statistical description of the positioning error.</a:t>
+            </a:r>
+          </a:p>
+          <a:p>
+            <a:pPr marL="434975" indent="-342900">
+              <a:buFont typeface="Arial" panose="020B0604020202020204" pitchFamily="34" charset="0"/>
+              <a:buChar char="•"/>
+            </a:pPr>
+            <a:r>
+              <a:rPr lang="en-US" dirty="0"/>
+              <a:t>Which errors were reduced by differential corrections?</a:t>
+            </a:r>
           </a:p>
         </p:txBody>
       </p:sp>
@@ -3714,7 +3731,13 @@
   <p:cSld>
     <p:spTree>
       <p:nvGrpSpPr>
-        <p:cNvPr id="1" name=""/>
+        <p:cNvPr id="1" name="">
+          <a:extLst>
+            <a:ext uri="{FF2B5EF4-FFF2-40B4-BE49-F238E27FC236}">
+              <a16:creationId xmlns:a16="http://schemas.microsoft.com/office/drawing/2014/main" id="{F7C1D8DC-4B55-716A-FAF6-A74DD003E2BA}"/>
+            </a:ext>
+          </a:extLst>
+        </p:cNvPr>
         <p:cNvGrpSpPr/>
         <p:nvPr/>
       </p:nvGrpSpPr>
@@ -3728,7 +3751,13 @@
       </p:grpSpPr>
       <p:sp>
         <p:nvSpPr>
-          <p:cNvPr id="2" name="Title 1"/>
+          <p:cNvPr id="2" name="Title 1">
+            <a:extLst>
+              <a:ext uri="{FF2B5EF4-FFF2-40B4-BE49-F238E27FC236}">
+                <a16:creationId xmlns:a16="http://schemas.microsoft.com/office/drawing/2014/main" id="{8365E787-5CF4-A89D-2A20-A1B3FC59B8CE}"/>
+              </a:ext>
+            </a:extLst>
+          </p:cNvPr>
           <p:cNvSpPr>
             <a:spLocks noGrp="1"/>
           </p:cNvSpPr>
@@ -3743,7 +3772,7 @@
           <a:p>
             <a:r>
               <a:rPr lang="en-US" dirty="0"/>
-              <a:t>Cycle slips</a:t>
+              <a:t>DGNSS residuals (optional)</a:t>
             </a:r>
             <a:endParaRPr dirty="0"/>
           </a:p>
@@ -3751,7 +3780,13 @@
       </p:sp>
       <p:sp>
         <p:nvSpPr>
-          <p:cNvPr id="3" name="Content Placeholder 2"/>
+          <p:cNvPr id="3" name="Content Placeholder 2">
+            <a:extLst>
+              <a:ext uri="{FF2B5EF4-FFF2-40B4-BE49-F238E27FC236}">
+                <a16:creationId xmlns:a16="http://schemas.microsoft.com/office/drawing/2014/main" id="{F7B8CCB6-7967-C324-52F1-7DE93CD603E8}"/>
+              </a:ext>
+            </a:extLst>
+          </p:cNvPr>
           <p:cNvSpPr>
             <a:spLocks noGrp="1"/>
           </p:cNvSpPr>
@@ -3765,24 +3800,42 @@
           <a:lstStyle/>
           <a:p>
             <a:pPr marL="434975" indent="-342900">
-              <a:buFontTx/>
-              <a:buChar char="-"/>
+              <a:buFont typeface="Arial" panose="020B0604020202020204" pitchFamily="34" charset="0"/>
+              <a:buChar char="•"/>
             </a:pPr>
             <a:r>
               <a:rPr lang="en-US" dirty="0"/>
-              <a:t>How many cycle slips have been detected by the rover and base receivers?</a:t>
+              <a:t>Paste your estimation residual figure.</a:t>
             </a:r>
           </a:p>
           <a:p>
             <a:pPr marL="434975" indent="-342900">
-              <a:buFontTx/>
-              <a:buChar char="-"/>
-            </a:pPr>
-            <a:endParaRPr dirty="0"/>
+              <a:buFont typeface="Arial" panose="020B0604020202020204" pitchFamily="34" charset="0"/>
+              <a:buChar char="•"/>
+            </a:pPr>
+            <a:r>
+              <a:rPr lang="en-US" dirty="0"/>
+              <a:t>Compared to SPP, which errors were reduced by differential corrections?</a:t>
+            </a:r>
+          </a:p>
+          <a:p>
+            <a:pPr marL="434975" indent="-342900">
+              <a:buFont typeface="Arial" panose="020B0604020202020204" pitchFamily="34" charset="0"/>
+              <a:buChar char="•"/>
+            </a:pPr>
+            <a:r>
+              <a:rPr lang="en-US" dirty="0"/>
+              <a:t>Did any error sources increase? </a:t>
+            </a:r>
           </a:p>
         </p:txBody>
       </p:sp>
     </p:spTree>
+    <p:extLst>
+      <p:ext uri="{BB962C8B-B14F-4D97-AF65-F5344CB8AC3E}">
+        <p14:creationId xmlns:p14="http://schemas.microsoft.com/office/powerpoint/2010/main" val="1896970406"/>
+      </p:ext>
+    </p:extLst>
   </p:cSld>
   <p:clrMapOvr>
     <a:masterClrMapping/>
@@ -4884,6 +4937,263 @@
         <p:cNvPr id="1" name="">
           <a:extLst>
             <a:ext uri="{FF2B5EF4-FFF2-40B4-BE49-F238E27FC236}">
+              <a16:creationId xmlns:a16="http://schemas.microsoft.com/office/drawing/2014/main" id="{F2D51C9C-8693-284C-7DA7-F6199ECA5158}"/>
+            </a:ext>
+          </a:extLst>
+        </p:cNvPr>
+        <p:cNvGrpSpPr/>
+        <p:nvPr/>
+      </p:nvGrpSpPr>
+      <p:grpSpPr>
+        <a:xfrm>
+          <a:off x="0" y="0"/>
+          <a:ext cx="0" cy="0"/>
+          <a:chOff x="0" y="0"/>
+          <a:chExt cx="0" cy="0"/>
+        </a:xfrm>
+      </p:grpSpPr>
+      <p:sp>
+        <p:nvSpPr>
+          <p:cNvPr id="2" name="Title 1">
+            <a:extLst>
+              <a:ext uri="{FF2B5EF4-FFF2-40B4-BE49-F238E27FC236}">
+                <a16:creationId xmlns:a16="http://schemas.microsoft.com/office/drawing/2014/main" id="{B2668DA8-368F-0FCF-506D-E025E405472C}"/>
+              </a:ext>
+            </a:extLst>
+          </p:cNvPr>
+          <p:cNvSpPr>
+            <a:spLocks noGrp="1"/>
+          </p:cNvSpPr>
+          <p:nvPr>
+            <p:ph type="title"/>
+          </p:nvPr>
+        </p:nvSpPr>
+        <p:spPr/>
+        <p:txBody>
+          <a:bodyPr/>
+          <a:lstStyle/>
+          <a:p>
+            <a:r>
+              <a:rPr lang="en-US" dirty="0"/>
+              <a:t>DGNSS - Treasure hunt</a:t>
+            </a:r>
+            <a:endParaRPr dirty="0"/>
+          </a:p>
+        </p:txBody>
+      </p:sp>
+      <p:sp>
+        <p:nvSpPr>
+          <p:cNvPr id="3" name="Content Placeholder 2">
+            <a:extLst>
+              <a:ext uri="{FF2B5EF4-FFF2-40B4-BE49-F238E27FC236}">
+                <a16:creationId xmlns:a16="http://schemas.microsoft.com/office/drawing/2014/main" id="{B7141BA1-B1AF-9E94-E685-FC08431AD3D1}"/>
+              </a:ext>
+            </a:extLst>
+          </p:cNvPr>
+          <p:cNvSpPr>
+            <a:spLocks noGrp="1"/>
+          </p:cNvSpPr>
+          <p:nvPr>
+            <p:ph idx="1"/>
+          </p:nvPr>
+        </p:nvSpPr>
+        <p:spPr/>
+        <p:txBody>
+          <a:bodyPr/>
+          <a:lstStyle/>
+          <a:p>
+            <a:pPr marL="434975" indent="-342900">
+              <a:buFont typeface="Arial" panose="020B0604020202020204" pitchFamily="34" charset="0"/>
+              <a:buChar char="•"/>
+            </a:pPr>
+            <a:r>
+              <a:rPr dirty="0"/>
+              <a:t>Paste your ENU error figure</a:t>
+            </a:r>
+            <a:r>
+              <a:rPr lang="en-US" dirty="0"/>
+              <a:t> for DGNSS solution on the </a:t>
+            </a:r>
+            <a:r>
+              <a:rPr lang="en-US" u="sng" dirty="0"/>
+              <a:t>longitude</a:t>
+            </a:r>
+            <a:r>
+              <a:rPr lang="en-US" dirty="0"/>
+              <a:t> file of the treasure hunt</a:t>
+            </a:r>
+          </a:p>
+        </p:txBody>
+      </p:sp>
+    </p:spTree>
+    <p:extLst>
+      <p:ext uri="{BB962C8B-B14F-4D97-AF65-F5344CB8AC3E}">
+        <p14:creationId xmlns:p14="http://schemas.microsoft.com/office/powerpoint/2010/main" val="3439539251"/>
+      </p:ext>
+    </p:extLst>
+  </p:cSld>
+  <p:clrMapOvr>
+    <a:masterClrMapping/>
+  </p:clrMapOvr>
+</p:sld>
+</file>
+
+<file path=ppt/slides/slide21.xml><?xml version="1.0" encoding="utf-8"?>
+<p:sld xmlns:a="http://schemas.openxmlformats.org/drawingml/2006/main" xmlns:r="http://schemas.openxmlformats.org/officeDocument/2006/relationships" xmlns:p="http://schemas.openxmlformats.org/presentationml/2006/main">
+  <p:cSld>
+    <p:spTree>
+      <p:nvGrpSpPr>
+        <p:cNvPr id="1" name=""/>
+        <p:cNvGrpSpPr/>
+        <p:nvPr/>
+      </p:nvGrpSpPr>
+      <p:grpSpPr>
+        <a:xfrm>
+          <a:off x="0" y="0"/>
+          <a:ext cx="0" cy="0"/>
+          <a:chOff x="0" y="0"/>
+          <a:chExt cx="0" cy="0"/>
+        </a:xfrm>
+      </p:grpSpPr>
+      <p:sp>
+        <p:nvSpPr>
+          <p:cNvPr id="2" name="Title 1"/>
+          <p:cNvSpPr>
+            <a:spLocks noGrp="1"/>
+          </p:cNvSpPr>
+          <p:nvPr>
+            <p:ph type="ctrTitle"/>
+          </p:nvPr>
+        </p:nvSpPr>
+        <p:spPr/>
+        <p:txBody>
+          <a:bodyPr/>
+          <a:lstStyle/>
+          <a:p>
+            <a:pPr algn="ctr"/>
+            <a:r>
+              <a:rPr dirty="0"/>
+              <a:t>Chapter 3: RTK</a:t>
+            </a:r>
+          </a:p>
+        </p:txBody>
+      </p:sp>
+      <p:sp>
+        <p:nvSpPr>
+          <p:cNvPr id="3" name="Subtitle 2"/>
+          <p:cNvSpPr>
+            <a:spLocks noGrp="1"/>
+          </p:cNvSpPr>
+          <p:nvPr>
+            <p:ph type="subTitle" idx="1"/>
+          </p:nvPr>
+        </p:nvSpPr>
+        <p:spPr/>
+        <p:txBody>
+          <a:bodyPr/>
+          <a:lstStyle/>
+          <a:p>
+            <a:endParaRPr dirty="0"/>
+          </a:p>
+        </p:txBody>
+      </p:sp>
+    </p:spTree>
+  </p:cSld>
+  <p:clrMapOvr>
+    <a:masterClrMapping/>
+  </p:clrMapOvr>
+</p:sld>
+</file>
+
+<file path=ppt/slides/slide22.xml><?xml version="1.0" encoding="utf-8"?>
+<p:sld xmlns:a="http://schemas.openxmlformats.org/drawingml/2006/main" xmlns:r="http://schemas.openxmlformats.org/officeDocument/2006/relationships" xmlns:p="http://schemas.openxmlformats.org/presentationml/2006/main">
+  <p:cSld>
+    <p:spTree>
+      <p:nvGrpSpPr>
+        <p:cNvPr id="1" name=""/>
+        <p:cNvGrpSpPr/>
+        <p:nvPr/>
+      </p:nvGrpSpPr>
+      <p:grpSpPr>
+        <a:xfrm>
+          <a:off x="0" y="0"/>
+          <a:ext cx="0" cy="0"/>
+          <a:chOff x="0" y="0"/>
+          <a:chExt cx="0" cy="0"/>
+        </a:xfrm>
+      </p:grpSpPr>
+      <p:sp>
+        <p:nvSpPr>
+          <p:cNvPr id="2" name="Title 1"/>
+          <p:cNvSpPr>
+            <a:spLocks noGrp="1"/>
+          </p:cNvSpPr>
+          <p:nvPr>
+            <p:ph type="title"/>
+          </p:nvPr>
+        </p:nvSpPr>
+        <p:spPr/>
+        <p:txBody>
+          <a:bodyPr/>
+          <a:lstStyle/>
+          <a:p>
+            <a:r>
+              <a:rPr lang="en-US" dirty="0"/>
+              <a:t>Cycle slips</a:t>
+            </a:r>
+            <a:endParaRPr dirty="0"/>
+          </a:p>
+        </p:txBody>
+      </p:sp>
+      <p:sp>
+        <p:nvSpPr>
+          <p:cNvPr id="3" name="Content Placeholder 2"/>
+          <p:cNvSpPr>
+            <a:spLocks noGrp="1"/>
+          </p:cNvSpPr>
+          <p:nvPr>
+            <p:ph idx="1"/>
+          </p:nvPr>
+        </p:nvSpPr>
+        <p:spPr/>
+        <p:txBody>
+          <a:bodyPr/>
+          <a:lstStyle/>
+          <a:p>
+            <a:pPr marL="434975" indent="-342900">
+              <a:buFontTx/>
+              <a:buChar char="-"/>
+            </a:pPr>
+            <a:r>
+              <a:rPr lang="en-US" dirty="0"/>
+              <a:t>How many cycle slips have been detected by the rover and base receivers?</a:t>
+            </a:r>
+          </a:p>
+          <a:p>
+            <a:pPr marL="434975" indent="-342900">
+              <a:buFontTx/>
+              <a:buChar char="-"/>
+            </a:pPr>
+            <a:endParaRPr dirty="0"/>
+          </a:p>
+        </p:txBody>
+      </p:sp>
+    </p:spTree>
+  </p:cSld>
+  <p:clrMapOvr>
+    <a:masterClrMapping/>
+  </p:clrMapOvr>
+</p:sld>
+</file>
+
+<file path=ppt/slides/slide23.xml><?xml version="1.0" encoding="utf-8"?>
+<p:sld xmlns:a="http://schemas.openxmlformats.org/drawingml/2006/main" xmlns:r="http://schemas.openxmlformats.org/officeDocument/2006/relationships" xmlns:p="http://schemas.openxmlformats.org/presentationml/2006/main">
+  <p:cSld>
+    <p:spTree>
+      <p:nvGrpSpPr>
+        <p:cNvPr id="1" name="">
+          <a:extLst>
+            <a:ext uri="{FF2B5EF4-FFF2-40B4-BE49-F238E27FC236}">
               <a16:creationId xmlns:a16="http://schemas.microsoft.com/office/drawing/2014/main" id="{1AC3C99D-6D58-31AE-AB4C-B106E589C3C2}"/>
             </a:ext>
           </a:extLst>
@@ -5003,7 +5313,7 @@
 </p:sld>
 </file>
 
-<file path=ppt/slides/slide21.xml><?xml version="1.0" encoding="utf-8"?>
+<file path=ppt/slides/slide24.xml><?xml version="1.0" encoding="utf-8"?>
 <p:sld xmlns:a="http://schemas.openxmlformats.org/drawingml/2006/main" xmlns:r="http://schemas.openxmlformats.org/officeDocument/2006/relationships" xmlns:p="http://schemas.openxmlformats.org/presentationml/2006/main">
   <p:cSld>
     <p:spTree>
@@ -5131,6 +5441,252 @@
     <p:extLst>
       <p:ext uri="{BB962C8B-B14F-4D97-AF65-F5344CB8AC3E}">
         <p14:creationId xmlns:p14="http://schemas.microsoft.com/office/powerpoint/2010/main" val="3282425585"/>
+      </p:ext>
+    </p:extLst>
+  </p:cSld>
+  <p:clrMapOvr>
+    <a:masterClrMapping/>
+  </p:clrMapOvr>
+</p:sld>
+</file>
+
+<file path=ppt/slides/slide25.xml><?xml version="1.0" encoding="utf-8"?>
+<p:sld xmlns:a="http://schemas.openxmlformats.org/drawingml/2006/main" xmlns:r="http://schemas.openxmlformats.org/officeDocument/2006/relationships" xmlns:p="http://schemas.openxmlformats.org/presentationml/2006/main">
+  <p:cSld>
+    <p:spTree>
+      <p:nvGrpSpPr>
+        <p:cNvPr id="1" name="">
+          <a:extLst>
+            <a:ext uri="{FF2B5EF4-FFF2-40B4-BE49-F238E27FC236}">
+              <a16:creationId xmlns:a16="http://schemas.microsoft.com/office/drawing/2014/main" id="{059EE8F0-6E25-AB95-ACB7-C3EC95772F3F}"/>
+            </a:ext>
+          </a:extLst>
+        </p:cNvPr>
+        <p:cNvGrpSpPr/>
+        <p:nvPr/>
+      </p:nvGrpSpPr>
+      <p:grpSpPr>
+        <a:xfrm>
+          <a:off x="0" y="0"/>
+          <a:ext cx="0" cy="0"/>
+          <a:chOff x="0" y="0"/>
+          <a:chExt cx="0" cy="0"/>
+        </a:xfrm>
+      </p:grpSpPr>
+      <p:sp>
+        <p:nvSpPr>
+          <p:cNvPr id="2" name="Title 1">
+            <a:extLst>
+              <a:ext uri="{FF2B5EF4-FFF2-40B4-BE49-F238E27FC236}">
+                <a16:creationId xmlns:a16="http://schemas.microsoft.com/office/drawing/2014/main" id="{BE2DB59C-805D-D065-AAC8-A89520ED5C29}"/>
+              </a:ext>
+            </a:extLst>
+          </p:cNvPr>
+          <p:cNvSpPr>
+            <a:spLocks noGrp="1"/>
+          </p:cNvSpPr>
+          <p:nvPr>
+            <p:ph type="title"/>
+          </p:nvPr>
+        </p:nvSpPr>
+        <p:spPr/>
+        <p:txBody>
+          <a:bodyPr/>
+          <a:lstStyle/>
+          <a:p>
+            <a:r>
+              <a:rPr lang="en-US" dirty="0"/>
+              <a:t>RTK solution</a:t>
+            </a:r>
+            <a:endParaRPr dirty="0"/>
+          </a:p>
+        </p:txBody>
+      </p:sp>
+      <p:sp>
+        <p:nvSpPr>
+          <p:cNvPr id="3" name="Content Placeholder 2">
+            <a:extLst>
+              <a:ext uri="{FF2B5EF4-FFF2-40B4-BE49-F238E27FC236}">
+                <a16:creationId xmlns:a16="http://schemas.microsoft.com/office/drawing/2014/main" id="{1D270775-B392-908D-9A58-67D08F96DBCF}"/>
+              </a:ext>
+            </a:extLst>
+          </p:cNvPr>
+          <p:cNvSpPr>
+            <a:spLocks noGrp="1"/>
+          </p:cNvSpPr>
+          <p:nvPr>
+            <p:ph idx="1"/>
+          </p:nvPr>
+        </p:nvSpPr>
+        <p:spPr/>
+        <p:txBody>
+          <a:bodyPr/>
+          <a:lstStyle/>
+          <a:p>
+            <a:pPr marL="434975" indent="-342900">
+              <a:buFont typeface="Arial" panose="020B0604020202020204" pitchFamily="34" charset="0"/>
+              <a:buChar char="•"/>
+            </a:pPr>
+            <a:r>
+              <a:rPr lang="en-US" dirty="0"/>
+              <a:t>Paste your ENU error figure.</a:t>
+            </a:r>
+          </a:p>
+          <a:p>
+            <a:pPr marL="434975" indent="-342900">
+              <a:buFont typeface="Arial" panose="020B0604020202020204" pitchFamily="34" charset="0"/>
+              <a:buChar char="•"/>
+            </a:pPr>
+            <a:r>
+              <a:rPr lang="en-US" dirty="0"/>
+              <a:t>Include your score.</a:t>
+            </a:r>
+          </a:p>
+          <a:p>
+            <a:pPr marL="434975" indent="-342900">
+              <a:buFont typeface="Arial" panose="020B0604020202020204" pitchFamily="34" charset="0"/>
+              <a:buChar char="•"/>
+            </a:pPr>
+            <a:r>
+              <a:rPr lang="en-US" dirty="0"/>
+              <a:t>Comment the statistical description of the positioning error.</a:t>
+            </a:r>
+          </a:p>
+          <a:p>
+            <a:pPr marL="434975" indent="-342900">
+              <a:buFont typeface="Arial" panose="020B0604020202020204" pitchFamily="34" charset="0"/>
+              <a:buChar char="•"/>
+            </a:pPr>
+            <a:r>
+              <a:rPr lang="en-US" dirty="0"/>
+              <a:t>What is the strongest assumption to be able to use this positioning algorithm?</a:t>
+            </a:r>
+          </a:p>
+          <a:p>
+            <a:pPr marL="434975" indent="-342900">
+              <a:buFont typeface="Arial" panose="020B0604020202020204" pitchFamily="34" charset="0"/>
+              <a:buChar char="•"/>
+            </a:pPr>
+            <a:r>
+              <a:rPr lang="en-US" dirty="0"/>
+              <a:t>Comment on the validity of such assumption for different classes of users: smartphones, automotive, aviation, geodesy</a:t>
+            </a:r>
+          </a:p>
+        </p:txBody>
+      </p:sp>
+    </p:spTree>
+    <p:extLst>
+      <p:ext uri="{BB962C8B-B14F-4D97-AF65-F5344CB8AC3E}">
+        <p14:creationId xmlns:p14="http://schemas.microsoft.com/office/powerpoint/2010/main" val="1228702149"/>
+      </p:ext>
+    </p:extLst>
+  </p:cSld>
+  <p:clrMapOvr>
+    <a:masterClrMapping/>
+  </p:clrMapOvr>
+</p:sld>
+</file>
+
+<file path=ppt/slides/slide26.xml><?xml version="1.0" encoding="utf-8"?>
+<p:sld xmlns:a="http://schemas.openxmlformats.org/drawingml/2006/main" xmlns:r="http://schemas.openxmlformats.org/officeDocument/2006/relationships" xmlns:p="http://schemas.openxmlformats.org/presentationml/2006/main">
+  <p:cSld>
+    <p:spTree>
+      <p:nvGrpSpPr>
+        <p:cNvPr id="1" name="">
+          <a:extLst>
+            <a:ext uri="{FF2B5EF4-FFF2-40B4-BE49-F238E27FC236}">
+              <a16:creationId xmlns:a16="http://schemas.microsoft.com/office/drawing/2014/main" id="{9C93C48A-4A95-9F6B-FED7-D4A1E5E60F39}"/>
+            </a:ext>
+          </a:extLst>
+        </p:cNvPr>
+        <p:cNvGrpSpPr/>
+        <p:nvPr/>
+      </p:nvGrpSpPr>
+      <p:grpSpPr>
+        <a:xfrm>
+          <a:off x="0" y="0"/>
+          <a:ext cx="0" cy="0"/>
+          <a:chOff x="0" y="0"/>
+          <a:chExt cx="0" cy="0"/>
+        </a:xfrm>
+      </p:grpSpPr>
+      <p:sp>
+        <p:nvSpPr>
+          <p:cNvPr id="2" name="Title 1">
+            <a:extLst>
+              <a:ext uri="{FF2B5EF4-FFF2-40B4-BE49-F238E27FC236}">
+                <a16:creationId xmlns:a16="http://schemas.microsoft.com/office/drawing/2014/main" id="{65FB15AE-5F60-C17C-63DA-CA1C8CC9BCCA}"/>
+              </a:ext>
+            </a:extLst>
+          </p:cNvPr>
+          <p:cNvSpPr>
+            <a:spLocks noGrp="1"/>
+          </p:cNvSpPr>
+          <p:nvPr>
+            <p:ph type="title"/>
+          </p:nvPr>
+        </p:nvSpPr>
+        <p:spPr/>
+        <p:txBody>
+          <a:bodyPr/>
+          <a:lstStyle/>
+          <a:p>
+            <a:r>
+              <a:rPr lang="en-US" dirty="0"/>
+              <a:t>RTK - Treasure hunt</a:t>
+            </a:r>
+            <a:endParaRPr dirty="0"/>
+          </a:p>
+        </p:txBody>
+      </p:sp>
+      <p:sp>
+        <p:nvSpPr>
+          <p:cNvPr id="3" name="Content Placeholder 2">
+            <a:extLst>
+              <a:ext uri="{FF2B5EF4-FFF2-40B4-BE49-F238E27FC236}">
+                <a16:creationId xmlns:a16="http://schemas.microsoft.com/office/drawing/2014/main" id="{D130952E-9F7A-B3C3-015A-C0D7E12C7C10}"/>
+              </a:ext>
+            </a:extLst>
+          </p:cNvPr>
+          <p:cNvSpPr>
+            <a:spLocks noGrp="1"/>
+          </p:cNvSpPr>
+          <p:nvPr>
+            <p:ph idx="1"/>
+          </p:nvPr>
+        </p:nvSpPr>
+        <p:spPr/>
+        <p:txBody>
+          <a:bodyPr/>
+          <a:lstStyle/>
+          <a:p>
+            <a:pPr marL="434975" indent="-342900">
+              <a:buFont typeface="Arial" panose="020B0604020202020204" pitchFamily="34" charset="0"/>
+              <a:buChar char="•"/>
+            </a:pPr>
+            <a:r>
+              <a:rPr dirty="0"/>
+              <a:t>Paste your ENU error figure</a:t>
+            </a:r>
+            <a:r>
+              <a:rPr lang="en-US" dirty="0"/>
+              <a:t> for RTK solution on the </a:t>
+            </a:r>
+            <a:r>
+              <a:rPr lang="en-US" u="sng" dirty="0"/>
+              <a:t>latitude</a:t>
+            </a:r>
+            <a:r>
+              <a:rPr lang="en-US" dirty="0"/>
+              <a:t> file of the treasure hunt</a:t>
+            </a:r>
+          </a:p>
+        </p:txBody>
+      </p:sp>
+    </p:spTree>
+    <p:extLst>
+      <p:ext uri="{BB962C8B-B14F-4D97-AF65-F5344CB8AC3E}">
+        <p14:creationId xmlns:p14="http://schemas.microsoft.com/office/powerpoint/2010/main" val="1986738697"/>
       </p:ext>
     </p:extLst>
   </p:cSld>
@@ -10460,7 +11016,7 @@
         <p:spPr/>
         <p:txBody>
           <a:bodyPr>
-            <a:normAutofit fontScale="85000" lnSpcReduction="20000"/>
+            <a:normAutofit lnSpcReduction="10000"/>
           </a:bodyPr>
           <a:lstStyle/>
           <a:p>
@@ -10509,7 +11065,7 @@
               <a:rPr lang="en-US" sz="1300" dirty="0">
                 <a:latin typeface="Consolas" panose="020B0609020204030204" pitchFamily="49" charset="0"/>
               </a:rPr>
-              <a:t>figures/</a:t>
+              <a:t>instructions/</a:t>
             </a:r>
           </a:p>
           <a:p>
@@ -10525,10 +11081,25 @@
               </a:spcAft>
             </a:pPr>
             <a:r>
+              <a:rPr lang="en-US" sz="1300" dirty="0" err="1">
+                <a:latin typeface="Consolas" panose="020B0609020204030204" pitchFamily="49" charset="0"/>
+              </a:rPr>
+              <a:t>src</a:t>
+            </a:r>
+            <a:r>
               <a:rPr lang="en-US" sz="1300" dirty="0">
                 <a:latin typeface="Consolas" panose="020B0609020204030204" pitchFamily="49" charset="0"/>
               </a:rPr>
-              <a:t>instructions/</a:t>
+              <a:t>/	</a:t>
+            </a:r>
+            <a:r>
+              <a:rPr lang="en-US" sz="1300" dirty="0">
+                <a:solidFill>
+                  <a:srgbClr val="FF0000"/>
+                </a:solidFill>
+                <a:latin typeface="Consolas" panose="020B0609020204030204" pitchFamily="49" charset="0"/>
+              </a:rPr>
+              <a:t>&lt;= code here!!</a:t>
             </a:r>
           </a:p>
           <a:p>
@@ -10547,7 +11118,7 @@
               <a:rPr lang="en-US" sz="1300" dirty="0">
                 <a:latin typeface="Consolas" panose="020B0609020204030204" pitchFamily="49" charset="0"/>
               </a:rPr>
-              <a:t>results/</a:t>
+              <a:t>tests/</a:t>
             </a:r>
           </a:p>
           <a:p>
@@ -10555,24 +11126,18 @@
               <a:lnSpc>
                 <a:spcPct val="120000"/>
               </a:lnSpc>
-              <a:spcBef>
-                <a:spcPts val="0"/>
-              </a:spcBef>
-              <a:spcAft>
-                <a:spcPts val="0"/>
-              </a:spcAft>
-            </a:pPr>
-            <a:r>
-              <a:rPr lang="en-US" sz="1300" dirty="0" err="1">
-                <a:latin typeface="Consolas" panose="020B0609020204030204" pitchFamily="49" charset="0"/>
-              </a:rPr>
-              <a:t>src</a:t>
-            </a:r>
-            <a:r>
-              <a:rPr lang="en-US" sz="1300" dirty="0">
-                <a:latin typeface="Consolas" panose="020B0609020204030204" pitchFamily="49" charset="0"/>
-              </a:rPr>
-              <a:t>/	&lt;= code here!!</a:t>
+            </a:pPr>
+            <a:endParaRPr lang="en-US" dirty="0"/>
+          </a:p>
+          <a:p>
+            <a:pPr lvl="1">
+              <a:lnSpc>
+                <a:spcPct val="120000"/>
+              </a:lnSpc>
+            </a:pPr>
+            <a:r>
+              <a:rPr lang="en-US" dirty="0"/>
+              <a:t>Detailed instructions will guide you through the coding of the various required functions</a:t>
             </a:r>
           </a:p>
           <a:p>
@@ -10580,18 +11145,10 @@
               <a:lnSpc>
                 <a:spcPct val="120000"/>
               </a:lnSpc>
-              <a:spcBef>
-                <a:spcPts val="0"/>
-              </a:spcBef>
-              <a:spcAft>
-                <a:spcPts val="0"/>
-              </a:spcAft>
-            </a:pPr>
-            <a:r>
-              <a:rPr lang="en-US" sz="1300" dirty="0">
-                <a:latin typeface="Consolas" panose="020B0609020204030204" pitchFamily="49" charset="0"/>
-              </a:rPr>
-              <a:t>tests/</a:t>
+            </a:pPr>
+            <a:r>
+              <a:rPr lang="en-US" dirty="0"/>
+              <a:t>After each implementation, unit tests have been written</a:t>
             </a:r>
           </a:p>
           <a:p>
@@ -10610,7 +11167,15 @@
             </a:pPr>
             <a:r>
               <a:rPr lang="en-US" dirty="0"/>
-              <a:t>Detailed instructions will guide you through the coding of the various required functions</a:t>
+              <a:t>Use this </a:t>
+            </a:r>
+            <a:r>
+              <a:rPr lang="en-US" dirty="0" err="1"/>
+              <a:t>powerpoint</a:t>
+            </a:r>
+            <a:r>
+              <a:rPr lang="en-US" dirty="0"/>
+              <a:t> to put your answers and your results</a:t>
             </a:r>
           </a:p>
           <a:p>
@@ -10619,9 +11184,17 @@
                 <a:spcPct val="120000"/>
               </a:lnSpc>
             </a:pPr>
+            <a:endParaRPr lang="en-US" dirty="0"/>
+          </a:p>
+          <a:p>
+            <a:pPr lvl="1">
+              <a:lnSpc>
+                <a:spcPct val="120000"/>
+              </a:lnSpc>
+            </a:pPr>
             <a:r>
               <a:rPr lang="en-US" dirty="0"/>
-              <a:t>After each implementation, unit tests have been written</a:t>
+              <a:t>The final mark will depend on</a:t>
             </a:r>
           </a:p>
           <a:p>
@@ -10630,25 +11203,9 @@
                 <a:spcPct val="120000"/>
               </a:lnSpc>
             </a:pPr>
-            <a:endParaRPr lang="en-US" dirty="0"/>
-          </a:p>
-          <a:p>
-            <a:pPr lvl="1">
-              <a:lnSpc>
-                <a:spcPct val="120000"/>
-              </a:lnSpc>
-            </a:pPr>
             <a:r>
               <a:rPr lang="en-US" dirty="0"/>
-              <a:t>Use this </a:t>
-            </a:r>
-            <a:r>
-              <a:rPr lang="en-US" dirty="0" err="1"/>
-              <a:t>powerpoint</a:t>
-            </a:r>
-            <a:r>
-              <a:rPr lang="en-US" dirty="0"/>
-              <a:t> to put your answers and your results</a:t>
+              <a:t>the number of passed tests</a:t>
             </a:r>
           </a:p>
           <a:p>
@@ -10657,18 +11214,15 @@
                 <a:spcPct val="120000"/>
               </a:lnSpc>
             </a:pPr>
+            <a:r>
+              <a:rPr lang="en-US" dirty="0"/>
+              <a:t>the answers in this </a:t>
+            </a:r>
+            <a:r>
+              <a:rPr lang="en-US" dirty="0" err="1"/>
+              <a:t>powerpoint</a:t>
+            </a:r>
             <a:endParaRPr lang="en-US" dirty="0"/>
-          </a:p>
-          <a:p>
-            <a:pPr lvl="1">
-              <a:lnSpc>
-                <a:spcPct val="120000"/>
-              </a:lnSpc>
-            </a:pPr>
-            <a:r>
-              <a:rPr lang="en-US" dirty="0"/>
-              <a:t>A leaderboard will be updated with the accuracy of your best solution for each algorithm 🏅</a:t>
-            </a:r>
           </a:p>
           <a:p>
             <a:pPr lvl="2">
@@ -10676,72 +11230,15 @@
                 <a:spcPct val="120000"/>
               </a:lnSpc>
             </a:pPr>
-            <a:endParaRPr lang="en-US" dirty="0"/>
-          </a:p>
-          <a:p>
-            <a:pPr lvl="1">
-              <a:lnSpc>
-                <a:spcPct val="120000"/>
-              </a:lnSpc>
-            </a:pPr>
             <a:r>
               <a:rPr lang="en-US" dirty="0"/>
-              <a:t>The final mark will depend on</a:t>
-            </a:r>
-          </a:p>
-          <a:p>
-            <a:pPr lvl="2">
-              <a:lnSpc>
-                <a:spcPct val="120000"/>
-              </a:lnSpc>
-            </a:pPr>
-            <a:r>
-              <a:rPr lang="en-US" dirty="0"/>
-              <a:t>the number of passed tests</a:t>
-            </a:r>
-          </a:p>
-          <a:p>
-            <a:pPr lvl="2">
-              <a:lnSpc>
-                <a:spcPct val="120000"/>
-              </a:lnSpc>
-            </a:pPr>
-            <a:r>
-              <a:rPr lang="en-US" dirty="0"/>
-              <a:t>the answers in this </a:t>
+              <a:t>the figures in this </a:t>
             </a:r>
             <a:r>
               <a:rPr lang="en-US" dirty="0" err="1"/>
               <a:t>powerpoint</a:t>
             </a:r>
             <a:endParaRPr lang="en-US" dirty="0"/>
-          </a:p>
-          <a:p>
-            <a:pPr lvl="2">
-              <a:lnSpc>
-                <a:spcPct val="120000"/>
-              </a:lnSpc>
-            </a:pPr>
-            <a:r>
-              <a:rPr lang="en-US" dirty="0"/>
-              <a:t>the figures in this </a:t>
-            </a:r>
-            <a:r>
-              <a:rPr lang="en-US" dirty="0" err="1"/>
-              <a:t>powerpoint</a:t>
-            </a:r>
-            <a:endParaRPr lang="en-US" dirty="0"/>
-          </a:p>
-          <a:p>
-            <a:pPr lvl="2">
-              <a:lnSpc>
-                <a:spcPct val="120000"/>
-              </a:lnSpc>
-            </a:pPr>
-            <a:r>
-              <a:rPr lang="en-US" dirty="0"/>
-              <a:t>you position in the leaderboard</a:t>
-            </a:r>
           </a:p>
         </p:txBody>
       </p:sp>
@@ -10821,7 +11318,13 @@
   <p:cSld>
     <p:spTree>
       <p:nvGrpSpPr>
-        <p:cNvPr id="1" name=""/>
+        <p:cNvPr id="1" name="">
+          <a:extLst>
+            <a:ext uri="{FF2B5EF4-FFF2-40B4-BE49-F238E27FC236}">
+              <a16:creationId xmlns:a16="http://schemas.microsoft.com/office/drawing/2014/main" id="{EA4CC67E-DC91-BB54-3822-271A6E088896}"/>
+            </a:ext>
+          </a:extLst>
+        </p:cNvPr>
         <p:cNvGrpSpPr/>
         <p:nvPr/>
       </p:nvGrpSpPr>
@@ -10835,50 +11338,148 @@
       </p:grpSpPr>
       <p:sp>
         <p:nvSpPr>
-          <p:cNvPr id="2" name="Title 1"/>
+          <p:cNvPr id="5" name="Text Placeholder 4">
+            <a:extLst>
+              <a:ext uri="{FF2B5EF4-FFF2-40B4-BE49-F238E27FC236}">
+                <a16:creationId xmlns:a16="http://schemas.microsoft.com/office/drawing/2014/main" id="{66D6ABD3-B072-853B-D455-84998EE62917}"/>
+              </a:ext>
+            </a:extLst>
+          </p:cNvPr>
           <p:cNvSpPr>
             <a:spLocks noGrp="1"/>
           </p:cNvSpPr>
           <p:nvPr>
-            <p:ph type="ctrTitle"/>
+            <p:ph type="body" sz="quarter" idx="14"/>
           </p:nvPr>
         </p:nvSpPr>
         <p:spPr/>
         <p:txBody>
-          <a:bodyPr/>
+          <a:bodyPr>
+            <a:normAutofit/>
+          </a:bodyPr>
           <a:lstStyle/>
           <a:p>
-            <a:pPr algn="ctr"/>
-            <a:r>
-              <a:rPr dirty="0"/>
-              <a:t>Chapter </a:t>
-            </a:r>
+            <a:pPr>
+              <a:lnSpc>
+                <a:spcPct val="120000"/>
+              </a:lnSpc>
+            </a:pPr>
             <a:r>
               <a:rPr lang="en-US" dirty="0"/>
-              <a:t>0</a:t>
-            </a:r>
-            <a:r>
-              <a:rPr dirty="0"/>
-              <a:t>: </a:t>
-            </a:r>
-            <a:r>
-              <a:rPr lang="en-US" dirty="0">
-                <a:latin typeface="Consolas" panose="020B0609020204030204" pitchFamily="49" charset="0"/>
-              </a:rPr>
-              <a:t>pandas</a:t>
-            </a:r>
-            <a:endParaRPr dirty="0">
-              <a:latin typeface="Consolas" panose="020B0609020204030204" pitchFamily="49" charset="0"/>
-            </a:endParaRPr>
-          </a:p>
-        </p:txBody>
-      </p:sp>
-      <p:sp>
-        <p:nvSpPr>
-          <p:cNvPr id="5" name="Subtitle 4">
-            <a:extLst>
-              <a:ext uri="{FF2B5EF4-FFF2-40B4-BE49-F238E27FC236}">
-                <a16:creationId xmlns:a16="http://schemas.microsoft.com/office/drawing/2014/main" id="{81014CAC-BFF3-451A-AF06-77505E4206E4}"/>
+              <a:t>Positioning accuracy leaderboard🏅</a:t>
+            </a:r>
+          </a:p>
+          <a:p>
+            <a:pPr lvl="1">
+              <a:lnSpc>
+                <a:spcPct val="120000"/>
+              </a:lnSpc>
+            </a:pPr>
+            <a:r>
+              <a:rPr lang="en-US" dirty="0"/>
+              <a:t>A leaderboard will be updated with the accuracy of your best solution for each algorithm</a:t>
+            </a:r>
+          </a:p>
+          <a:p>
+            <a:pPr lvl="1">
+              <a:lnSpc>
+                <a:spcPct val="120000"/>
+              </a:lnSpc>
+            </a:pPr>
+            <a:endParaRPr lang="en-US" dirty="0"/>
+          </a:p>
+          <a:p>
+            <a:pPr lvl="1">
+              <a:lnSpc>
+                <a:spcPct val="120000"/>
+              </a:lnSpc>
+            </a:pPr>
+            <a:endParaRPr lang="en-US" dirty="0"/>
+          </a:p>
+          <a:p>
+            <a:pPr>
+              <a:lnSpc>
+                <a:spcPct val="120000"/>
+              </a:lnSpc>
+            </a:pPr>
+            <a:r>
+              <a:rPr lang="en-US" dirty="0"/>
+              <a:t>Treasure hunt 💰</a:t>
+            </a:r>
+          </a:p>
+          <a:p>
+            <a:pPr lvl="1">
+              <a:lnSpc>
+                <a:spcPct val="120000"/>
+              </a:lnSpc>
+            </a:pPr>
+            <a:r>
+              <a:rPr lang="en-US" dirty="0"/>
+              <a:t>We added a playful challenge that you can solve if you reach the goals of all the project.</a:t>
+            </a:r>
+          </a:p>
+          <a:p>
+            <a:pPr lvl="1">
+              <a:lnSpc>
+                <a:spcPct val="120000"/>
+              </a:lnSpc>
+            </a:pPr>
+            <a:endParaRPr lang="en-US" dirty="0"/>
+          </a:p>
+          <a:p>
+            <a:pPr lvl="1">
+              <a:lnSpc>
+                <a:spcPct val="120000"/>
+              </a:lnSpc>
+            </a:pPr>
+            <a:r>
+              <a:rPr lang="en-US" dirty="0"/>
+              <a:t>The folder “data/</a:t>
+            </a:r>
+            <a:r>
+              <a:rPr lang="en-US" dirty="0" err="1"/>
+              <a:t>treasure_hunt</a:t>
+            </a:r>
+            <a:r>
+              <a:rPr lang="en-US" dirty="0"/>
+              <a:t>” contains some particular GNSS observations.</a:t>
+            </a:r>
+          </a:p>
+          <a:p>
+            <a:pPr lvl="2">
+              <a:lnSpc>
+                <a:spcPct val="120000"/>
+              </a:lnSpc>
+            </a:pPr>
+            <a:r>
+              <a:rPr lang="en-US" dirty="0"/>
+              <a:t>Each group shall choose </a:t>
+            </a:r>
+            <a:r>
+              <a:rPr lang="en-US"/>
+              <a:t>a couple of files</a:t>
+            </a:r>
+            <a:endParaRPr lang="en-US" dirty="0"/>
+          </a:p>
+          <a:p>
+            <a:pPr lvl="1">
+              <a:lnSpc>
+                <a:spcPct val="120000"/>
+              </a:lnSpc>
+            </a:pPr>
+            <a:r>
+              <a:rPr lang="en-US" dirty="0"/>
+              <a:t>Try to process them with your different positioning algorithms to unlock clues!!</a:t>
+            </a:r>
+          </a:p>
+        </p:txBody>
+      </p:sp>
+      <p:sp>
+        <p:nvSpPr>
+          <p:cNvPr id="3" name="Slide Number Placeholder 2">
+            <a:extLst>
+              <a:ext uri="{FF2B5EF4-FFF2-40B4-BE49-F238E27FC236}">
+                <a16:creationId xmlns:a16="http://schemas.microsoft.com/office/drawing/2014/main" id="{4707936A-04F5-D74C-246C-9F4D897EFD7A}"/>
               </a:ext>
             </a:extLst>
           </p:cNvPr>
@@ -10886,7 +11487,7 @@
             <a:spLocks noGrp="1"/>
           </p:cNvSpPr>
           <p:nvPr>
-            <p:ph type="subTitle" idx="1"/>
+            <p:ph type="sldNum" sz="quarter" idx="12"/>
           </p:nvPr>
         </p:nvSpPr>
         <p:spPr/>
@@ -10894,11 +11495,49 @@
           <a:bodyPr/>
           <a:lstStyle/>
           <a:p>
-            <a:endParaRPr lang="en-US"/>
+            <a:fld id="{733122C9-A0B9-462F-8757-0847AD287B63}" type="slidenum">
+              <a:rPr lang="fr-FR" smtClean="0"/>
+              <a:pPr/>
+              <a:t>9</a:t>
+            </a:fld>
+            <a:endParaRPr lang="fr-FR" dirty="0"/>
+          </a:p>
+        </p:txBody>
+      </p:sp>
+      <p:sp>
+        <p:nvSpPr>
+          <p:cNvPr id="4" name="Title 3">
+            <a:extLst>
+              <a:ext uri="{FF2B5EF4-FFF2-40B4-BE49-F238E27FC236}">
+                <a16:creationId xmlns:a16="http://schemas.microsoft.com/office/drawing/2014/main" id="{DAB08AD8-EAD9-9D31-F960-E72073A607D6}"/>
+              </a:ext>
+            </a:extLst>
+          </p:cNvPr>
+          <p:cNvSpPr>
+            <a:spLocks noGrp="1"/>
+          </p:cNvSpPr>
+          <p:nvPr>
+            <p:ph type="title"/>
+          </p:nvPr>
+        </p:nvSpPr>
+        <p:spPr/>
+        <p:txBody>
+          <a:bodyPr/>
+          <a:lstStyle/>
+          <a:p>
+            <a:r>
+              <a:rPr lang="en-US" dirty="0"/>
+              <a:t>Practical works outline</a:t>
+            </a:r>
           </a:p>
         </p:txBody>
       </p:sp>
     </p:spTree>
+    <p:extLst>
+      <p:ext uri="{BB962C8B-B14F-4D97-AF65-F5344CB8AC3E}">
+        <p14:creationId xmlns:p14="http://schemas.microsoft.com/office/powerpoint/2010/main" val="2710805320"/>
+      </p:ext>
+    </p:extLst>
   </p:cSld>
   <p:clrMapOvr>
     <a:masterClrMapping/>

</xml_diff>